<commit_message>
Added IActorRepository with implementation
</commit_message>
<xml_diff>
--- a/Slides/Lecture07 - JSON and the REST, ASP.NET Core.pptx
+++ b/Slides/Lecture07 - JSON and the REST, ASP.NET Core.pptx
@@ -5834,7 +5834,7 @@
           <p:nvPr>
             <p:extLst>
               <p:ext uri="{D42A27DB-BD31-4B8C-83A1-F6EECF244321}">
-                <p14:modId xmlns:p14="http://schemas.microsoft.com/office/powerpoint/2010/main" val="185615885"/>
+                <p14:modId xmlns:p14="http://schemas.microsoft.com/office/powerpoint/2010/main" val="2564218958"/>
               </p:ext>
             </p:extLst>
           </p:nvPr>
@@ -6063,7 +6063,7 @@
                     <a:p>
                       <a:r>
                         <a:rPr lang="en-US" sz="1800" dirty="0"/>
-                        <a:t>No content</a:t>
+                        <a:t>No Content</a:t>
                       </a:r>
                       <a:endParaRPr lang="en-US" sz="1800" dirty="0">
                         <a:solidFill>
@@ -6106,7 +6106,7 @@
                     <a:p>
                       <a:r>
                         <a:rPr lang="en-US" sz="1800" dirty="0"/>
-                        <a:t>Moved permanently</a:t>
+                        <a:t>Moved Permanently</a:t>
                       </a:r>
                       <a:endParaRPr lang="en-US" sz="1800" dirty="0">
                         <a:solidFill>
@@ -6149,11 +6149,11 @@
                     <a:p>
                       <a:r>
                         <a:rPr lang="en-US" sz="1800" dirty="0"/>
-                        <a:t>Moved</a:t>
+                        <a:t>Found (aka Moved</a:t>
                       </a:r>
                       <a:r>
                         <a:rPr lang="en-US" sz="1800" baseline="0" dirty="0"/>
-                        <a:t> temporarily </a:t>
+                        <a:t> Temporarily)</a:t>
                       </a:r>
                       <a:endParaRPr lang="en-US" sz="1800" dirty="0">
                         <a:solidFill>
@@ -6217,7 +6217,7 @@
                       </a:r>
                       <a:r>
                         <a:rPr lang="en-US" sz="1800" baseline="0" dirty="0"/>
-                        <a:t> request</a:t>
+                        <a:t> Request</a:t>
                       </a:r>
                       <a:endParaRPr lang="en-US" sz="1800" dirty="0">
                         <a:solidFill>
@@ -6346,7 +6346,7 @@
                     <a:p>
                       <a:r>
                         <a:rPr lang="en-US" sz="1800" dirty="0"/>
-                        <a:t>Not found</a:t>
+                        <a:t>Not Found</a:t>
                       </a:r>
                       <a:endParaRPr lang="en-US" sz="1800" dirty="0">
                         <a:solidFill>
@@ -6432,7 +6432,7 @@
                     <a:p>
                       <a:r>
                         <a:rPr lang="en-US" sz="1800" dirty="0"/>
-                        <a:t>Internal server error </a:t>
+                        <a:t>Internal Server Error </a:t>
                       </a:r>
                       <a:endParaRPr lang="en-US" sz="1800" dirty="0">
                         <a:solidFill>
@@ -6475,7 +6475,7 @@
                     <a:p>
                       <a:r>
                         <a:rPr lang="en-US" sz="1800" dirty="0"/>
-                        <a:t>Not implemented</a:t>
+                        <a:t>Not Implemented</a:t>
                       </a:r>
                       <a:endParaRPr lang="en-US" sz="1800" dirty="0">
                         <a:solidFill>
@@ -6517,12 +6517,12 @@
                     <a:lstStyle/>
                     <a:p>
                       <a:r>
-                        <a:rPr lang="en-US" sz="1800" dirty="0"/>
+                        <a:rPr lang="en-US" sz="1800"/>
                         <a:t>Service</a:t>
                       </a:r>
                       <a:r>
-                        <a:rPr lang="en-US" sz="1800" baseline="0" dirty="0"/>
-                        <a:t> unavailable</a:t>
+                        <a:rPr lang="en-US" sz="1800" baseline="0"/>
+                        <a:t> Unavailable</a:t>
                       </a:r>
                       <a:endParaRPr lang="en-US" sz="1800" dirty="0">
                         <a:solidFill>
@@ -10055,6 +10055,15 @@
 </file>
 
 <file path=customXml/item1.xml><?xml version="1.0" encoding="utf-8"?>
+<?mso-contentType ?>
+<FormTemplates xmlns="http://schemas.microsoft.com/sharepoint/v3/contenttype/forms">
+  <Display>DocumentLibraryForm</Display>
+  <Edit>DocumentLibraryForm</Edit>
+  <New>DocumentLibraryForm</New>
+</FormTemplates>
+</file>
+
+<file path=customXml/item2.xml><?xml version="1.0" encoding="utf-8"?>
 <ct:contentTypeSchema xmlns:ct="http://schemas.microsoft.com/office/2006/metadata/contentType" xmlns:ma="http://schemas.microsoft.com/office/2006/metadata/properties/metaAttributes" ct:_="" ma:_="" ma:contentTypeName="PresentationsDoc" ma:contentTypeID="0x010100B88FC3ECA26D1C46B3C4C83281D2EB9C003BBE479AF4108146A616B6B5E7069DBC" ma:contentTypeVersion="61" ma:contentTypeDescription="" ma:contentTypeScope="" ma:versionID="72533711bacf991a4680f48ae6b725f9">
   <xsd:schema xmlns:xsd="http://www.w3.org/2001/XMLSchema" xmlns:xs="http://www.w3.org/2001/XMLSchema" xmlns:p="http://schemas.microsoft.com/office/2006/metadata/properties" xmlns:ns2="2295e2e7-0eeb-498e-8716-217bb2ee6ee3" xmlns:ns3="8b529f77-48ab-4581-b468-93f09345b8aa" targetNamespace="http://schemas.microsoft.com/office/2006/metadata/properties" ma:root="true" ma:fieldsID="dde17010d50e6e632f300eac8dfd378e" ns2:_="" ns3:_="">
     <xsd:import namespace="2295e2e7-0eeb-498e-8716-217bb2ee6ee3"/>
@@ -10333,15 +10342,6 @@
 </ct:contentTypeSchema>
 </file>
 
-<file path=customXml/item2.xml><?xml version="1.0" encoding="utf-8"?>
-<?mso-contentType ?>
-<FormTemplates xmlns="http://schemas.microsoft.com/sharepoint/v3/contenttype/forms">
-  <Display>DocumentLibraryForm</Display>
-  <Edit>DocumentLibraryForm</Edit>
-  <New>DocumentLibraryForm</New>
-</FormTemplates>
-</file>
-
 <file path=customXml/item3.xml><?xml version="1.0" encoding="utf-8"?>
 <p:properties xmlns:p="http://schemas.microsoft.com/office/2006/metadata/properties" xmlns:xsi="http://www.w3.org/2001/XMLSchema-instance" xmlns:pc="http://schemas.microsoft.com/office/infopath/2007/PartnerControls">
   <documentManagement>
@@ -10398,6 +10398,14 @@
 </file>
 
 <file path=customXml/itemProps1.xml><?xml version="1.0" encoding="utf-8"?>
+<ds:datastoreItem xmlns:ds="http://schemas.openxmlformats.org/officeDocument/2006/customXml" ds:itemID="{758FDAC0-319D-4A54-8D8E-1D42CB1F8004}">
+  <ds:schemaRefs>
+    <ds:schemaRef ds:uri="http://schemas.microsoft.com/sharepoint/v3/contenttype/forms"/>
+  </ds:schemaRefs>
+</ds:datastoreItem>
+</file>
+
+<file path=customXml/itemProps2.xml><?xml version="1.0" encoding="utf-8"?>
 <ds:datastoreItem xmlns:ds="http://schemas.openxmlformats.org/officeDocument/2006/customXml" ds:itemID="{A4A71FB1-3FB8-468F-9C64-2246CB74C7D9}">
   <ds:schemaRefs>
     <ds:schemaRef ds:uri="http://schemas.microsoft.com/office/2006/metadata/contentType"/>
@@ -10412,14 +10420,6 @@
     <ds:schemaRef ds:uri="http://purl.org/dc/elements/1.1/"/>
     <ds:schemaRef ds:uri="http://purl.org/dc/terms/"/>
     <ds:schemaRef ds:uri="http://schemas.microsoft.com/internal/obd"/>
-  </ds:schemaRefs>
-</ds:datastoreItem>
-</file>
-
-<file path=customXml/itemProps2.xml><?xml version="1.0" encoding="utf-8"?>
-<ds:datastoreItem xmlns:ds="http://schemas.openxmlformats.org/officeDocument/2006/customXml" ds:itemID="{758FDAC0-319D-4A54-8D8E-1D42CB1F8004}">
-  <ds:schemaRefs>
-    <ds:schemaRef ds:uri="http://schemas.microsoft.com/sharepoint/v3/contenttype/forms"/>
   </ds:schemaRefs>
 </ds:datastoreItem>
 </file>

</xml_diff>